<commit_message>
HTML - WEEK 3 DAY 3.pptx
</commit_message>
<xml_diff>
--- a/Presentations/HTML - WEEK 3 DAY 3.pptx
+++ b/Presentations/HTML - WEEK 3 DAY 3.pptx
@@ -220,7 +220,7 @@
             <a:fld id="{1D8BD707-D9CF-40AE-B4C6-C98DA3205C09}" type="datetimeFigureOut">
               <a:rPr lang="en-US" smtClean="0"/>
               <a:pPr/>
-              <a:t>19-Jan-23</a:t>
+              <a:t>06-Jun-23</a:t>
             </a:fld>
             <a:endParaRPr lang="en-US"/>
           </a:p>
@@ -448,7 +448,7 @@
             <a:fld id="{1D8BD707-D9CF-40AE-B4C6-C98DA3205C09}" type="datetimeFigureOut">
               <a:rPr lang="en-US" smtClean="0"/>
               <a:pPr/>
-              <a:t>19-Jan-23</a:t>
+              <a:t>06-Jun-23</a:t>
             </a:fld>
             <a:endParaRPr lang="en-US"/>
           </a:p>
@@ -625,7 +625,7 @@
             <a:fld id="{1D8BD707-D9CF-40AE-B4C6-C98DA3205C09}" type="datetimeFigureOut">
               <a:rPr lang="en-US" smtClean="0"/>
               <a:pPr/>
-              <a:t>19-Jan-23</a:t>
+              <a:t>06-Jun-23</a:t>
             </a:fld>
             <a:endParaRPr lang="en-US"/>
           </a:p>
@@ -792,7 +792,7 @@
             <a:fld id="{1D8BD707-D9CF-40AE-B4C6-C98DA3205C09}" type="datetimeFigureOut">
               <a:rPr lang="en-US" smtClean="0"/>
               <a:pPr/>
-              <a:t>19-Jan-23</a:t>
+              <a:t>06-Jun-23</a:t>
             </a:fld>
             <a:endParaRPr lang="en-US"/>
           </a:p>
@@ -1038,7 +1038,7 @@
             <a:fld id="{1D8BD707-D9CF-40AE-B4C6-C98DA3205C09}" type="datetimeFigureOut">
               <a:rPr lang="en-US" smtClean="0"/>
               <a:pPr/>
-              <a:t>19-Jan-23</a:t>
+              <a:t>06-Jun-23</a:t>
             </a:fld>
             <a:endParaRPr lang="en-US"/>
           </a:p>
@@ -1304,7 +1304,7 @@
             <a:fld id="{1D8BD707-D9CF-40AE-B4C6-C98DA3205C09}" type="datetimeFigureOut">
               <a:rPr lang="en-US" smtClean="0"/>
               <a:pPr/>
-              <a:t>19-Jan-23</a:t>
+              <a:t>06-Jun-23</a:t>
             </a:fld>
             <a:endParaRPr lang="en-US"/>
           </a:p>
@@ -1680,7 +1680,7 @@
             <a:fld id="{1D8BD707-D9CF-40AE-B4C6-C98DA3205C09}" type="datetimeFigureOut">
               <a:rPr lang="en-US" smtClean="0"/>
               <a:pPr/>
-              <a:t>19-Jan-23</a:t>
+              <a:t>06-Jun-23</a:t>
             </a:fld>
             <a:endParaRPr lang="en-US"/>
           </a:p>
@@ -1795,7 +1795,7 @@
             <a:fld id="{1D8BD707-D9CF-40AE-B4C6-C98DA3205C09}" type="datetimeFigureOut">
               <a:rPr lang="en-US" smtClean="0"/>
               <a:pPr/>
-              <a:t>19-Jan-23</a:t>
+              <a:t>06-Jun-23</a:t>
             </a:fld>
             <a:endParaRPr lang="en-US"/>
           </a:p>
@@ -1887,7 +1887,7 @@
             <a:fld id="{1D8BD707-D9CF-40AE-B4C6-C98DA3205C09}" type="datetimeFigureOut">
               <a:rPr lang="en-US" smtClean="0"/>
               <a:pPr/>
-              <a:t>19-Jan-23</a:t>
+              <a:t>06-Jun-23</a:t>
             </a:fld>
             <a:endParaRPr lang="en-US"/>
           </a:p>
@@ -2147,7 +2147,7 @@
             <a:fld id="{1D8BD707-D9CF-40AE-B4C6-C98DA3205C09}" type="datetimeFigureOut">
               <a:rPr lang="en-US" smtClean="0"/>
               <a:pPr/>
-              <a:t>19-Jan-23</a:t>
+              <a:t>06-Jun-23</a:t>
             </a:fld>
             <a:endParaRPr lang="en-US"/>
           </a:p>
@@ -2413,7 +2413,7 @@
             <a:fld id="{1D8BD707-D9CF-40AE-B4C6-C98DA3205C09}" type="datetimeFigureOut">
               <a:rPr lang="en-US" smtClean="0"/>
               <a:pPr/>
-              <a:t>19-Jan-23</a:t>
+              <a:t>06-Jun-23</a:t>
             </a:fld>
             <a:endParaRPr lang="en-US"/>
           </a:p>
@@ -2632,7 +2632,7 @@
             <a:fld id="{1D8BD707-D9CF-40AE-B4C6-C98DA3205C09}" type="datetimeFigureOut">
               <a:rPr lang="en-US" smtClean="0"/>
               <a:pPr/>
-              <a:t>19-Jan-23</a:t>
+              <a:t>06-Jun-23</a:t>
             </a:fld>
             <a:endParaRPr lang="en-US"/>
           </a:p>
@@ -3183,7 +3183,7 @@
         <p:spPr>
           <a:xfrm>
             <a:off x="371928" y="1752600"/>
-            <a:ext cx="8320314" cy="3785652"/>
+            <a:ext cx="8320314" cy="3416320"/>
           </a:xfrm>
           <a:prstGeom prst="rect">
             <a:avLst/>
@@ -3376,6 +3376,7 @@
             </a:r>
           </a:p>
           <a:p>
+            <a:pPr marL="0" lvl="1"/>
             <a:r>
               <a:rPr lang="en-US" sz="2400" b="1" dirty="0" smtClean="0">
                 <a:solidFill>
@@ -3385,7 +3386,7 @@
                 <a:ea typeface="Tahoma" pitchFamily="34" charset="0"/>
                 <a:cs typeface="Tahoma" pitchFamily="34" charset="0"/>
               </a:rPr>
-              <a:t>20. 21. </a:t>
+              <a:t>20. Progress </a:t>
             </a:r>
             <a:r>
               <a:rPr lang="en-US" sz="2400" b="1" dirty="0">
@@ -3396,7 +3397,43 @@
                 <a:ea typeface="Tahoma" pitchFamily="34" charset="0"/>
                 <a:cs typeface="Tahoma" pitchFamily="34" charset="0"/>
               </a:rPr>
-              <a:t>Input &gt; </a:t>
+              <a:t>{value, min, max} &lt;/</a:t>
+            </a:r>
+            <a:r>
+              <a:rPr lang="en-US" sz="2400" b="1" dirty="0" smtClean="0">
+                <a:solidFill>
+                  <a:srgbClr val="002060"/>
+                </a:solidFill>
+                <a:latin typeface="Tahoma" pitchFamily="34" charset="0"/>
+                <a:ea typeface="Tahoma" pitchFamily="34" charset="0"/>
+                <a:cs typeface="Tahoma" pitchFamily="34" charset="0"/>
+              </a:rPr>
+              <a:t>progress&gt;</a:t>
+            </a:r>
+          </a:p>
+          <a:p>
+            <a:pPr marL="0" lvl="1"/>
+            <a:r>
+              <a:rPr lang="en-US" sz="2400" b="1" dirty="0" smtClean="0">
+                <a:solidFill>
+                  <a:srgbClr val="002060"/>
+                </a:solidFill>
+                <a:latin typeface="Tahoma" pitchFamily="34" charset="0"/>
+                <a:ea typeface="Tahoma" pitchFamily="34" charset="0"/>
+                <a:cs typeface="Tahoma" pitchFamily="34" charset="0"/>
+              </a:rPr>
+              <a:t>21. Input </a:t>
+            </a:r>
+            <a:r>
+              <a:rPr lang="en-US" sz="2400" b="1" dirty="0">
+                <a:solidFill>
+                  <a:srgbClr val="002060"/>
+                </a:solidFill>
+                <a:latin typeface="Tahoma" pitchFamily="34" charset="0"/>
+                <a:ea typeface="Tahoma" pitchFamily="34" charset="0"/>
+                <a:cs typeface="Tahoma" pitchFamily="34" charset="0"/>
+              </a:rPr>
+              <a:t>&gt; </a:t>
             </a:r>
             <a:r>
               <a:rPr lang="en-US" sz="2400" b="1" dirty="0" smtClean="0">
@@ -3432,21 +3469,10 @@
                 <a:ea typeface="Tahoma" pitchFamily="34" charset="0"/>
                 <a:cs typeface="Tahoma" pitchFamily="34" charset="0"/>
               </a:rPr>
-              <a:t>Min, Max, Value </a:t>
-            </a:r>
-            <a:endParaRPr lang="en-US" sz="2400" b="1" dirty="0">
-              <a:solidFill>
-                <a:srgbClr val="002060"/>
-              </a:solidFill>
-              <a:latin typeface="Tahoma" pitchFamily="34" charset="0"/>
-              <a:ea typeface="Tahoma" pitchFamily="34" charset="0"/>
-              <a:cs typeface="Tahoma" pitchFamily="34" charset="0"/>
-            </a:endParaRPr>
-          </a:p>
-          <a:p>
-            <a:pPr marL="0" lvl="1"/>
-            <a:r>
-              <a:rPr lang="en-US" sz="2400" b="1" dirty="0" smtClean="0">
+              <a:t>Min, Max</a:t>
+            </a:r>
+            <a:r>
+              <a:rPr lang="en-US" sz="2400" b="1" smtClean="0">
                 <a:solidFill>
                   <a:srgbClr val="002060"/>
                 </a:solidFill>
@@ -3454,10 +3480,10 @@
                 <a:ea typeface="Tahoma" pitchFamily="34" charset="0"/>
                 <a:cs typeface="Tahoma" pitchFamily="34" charset="0"/>
               </a:rPr>
-              <a:t>22. </a:t>
-            </a:r>
-            <a:r>
-              <a:rPr lang="en-US" sz="2400" b="1" dirty="0">
+              <a:t>, </a:t>
+            </a:r>
+            <a:r>
+              <a:rPr lang="en-US" sz="2400" b="1" smtClean="0">
                 <a:solidFill>
                   <a:srgbClr val="002060"/>
                 </a:solidFill>
@@ -3465,11 +3491,8 @@
                 <a:ea typeface="Tahoma" pitchFamily="34" charset="0"/>
                 <a:cs typeface="Tahoma" pitchFamily="34" charset="0"/>
               </a:rPr>
-              <a:t>Progress {value, min, max} &lt;/progress&gt;</a:t>
-            </a:r>
-          </a:p>
-          <a:p>
-            <a:pPr marL="0" lvl="1"/>
+              <a:t>Value</a:t>
+            </a:r>
             <a:endParaRPr lang="en-US" sz="2400" b="1" dirty="0">
               <a:solidFill>
                 <a:srgbClr val="002060"/>

</xml_diff>